<commit_message>
First draft of Docker/ACS lab
</commit_message>
<xml_diff>
--- a/Workshop/6. HPC/HPC and Azure Container Service.pptx
+++ b/Workshop/6. HPC/HPC and Azure Container Service.pptx
@@ -213,7 +213,7 @@
           <a:p>
             <a:fld id="{49B60EF2-7028-489F-85D8-FE86CD7CF2A0}" type="datetimeFigureOut">
               <a:rPr lang="en-US" smtClean="0"/>
-              <a:t>6/23/2016</a:t>
+              <a:t>7/1/2016</a:t>
             </a:fld>
             <a:endParaRPr lang="en-US"/>
           </a:p>
@@ -1563,7 +1563,7 @@
           <a:p>
             <a:fld id="{0459C166-16D3-4A25-A2F8-C51E0E346B22}" type="datetimeFigureOut">
               <a:rPr lang="en-US" smtClean="0"/>
-              <a:t>6/23/2016</a:t>
+              <a:t>7/1/2016</a:t>
             </a:fld>
             <a:endParaRPr lang="en-US"/>
           </a:p>
@@ -1658,7 +1658,7 @@
           <a:p>
             <a:fld id="{0459C166-16D3-4A25-A2F8-C51E0E346B22}" type="datetimeFigureOut">
               <a:rPr lang="en-US" smtClean="0"/>
-              <a:t>6/23/2016</a:t>
+              <a:t>7/1/2016</a:t>
             </a:fld>
             <a:endParaRPr lang="en-US"/>
           </a:p>
@@ -1933,7 +1933,7 @@
           <a:p>
             <a:fld id="{0459C166-16D3-4A25-A2F8-C51E0E346B22}" type="datetimeFigureOut">
               <a:rPr lang="en-US" smtClean="0"/>
-              <a:t>6/23/2016</a:t>
+              <a:t>7/1/2016</a:t>
             </a:fld>
             <a:endParaRPr lang="en-US"/>
           </a:p>
@@ -2185,7 +2185,7 @@
           <a:p>
             <a:fld id="{0459C166-16D3-4A25-A2F8-C51E0E346B22}" type="datetimeFigureOut">
               <a:rPr lang="en-US" smtClean="0"/>
-              <a:t>6/23/2016</a:t>
+              <a:t>7/1/2016</a:t>
             </a:fld>
             <a:endParaRPr lang="en-US"/>
           </a:p>
@@ -2353,7 +2353,7 @@
           <a:p>
             <a:fld id="{0459C166-16D3-4A25-A2F8-C51E0E346B22}" type="datetimeFigureOut">
               <a:rPr lang="en-US" smtClean="0"/>
-              <a:t>6/23/2016</a:t>
+              <a:t>7/1/2016</a:t>
             </a:fld>
             <a:endParaRPr lang="en-US"/>
           </a:p>
@@ -2531,7 +2531,7 @@
           <a:p>
             <a:fld id="{0459C166-16D3-4A25-A2F8-C51E0E346B22}" type="datetimeFigureOut">
               <a:rPr lang="en-US" smtClean="0"/>
-              <a:t>6/23/2016</a:t>
+              <a:t>7/1/2016</a:t>
             </a:fld>
             <a:endParaRPr lang="en-US"/>
           </a:p>
@@ -4458,7 +4458,7 @@
           <a:p>
             <a:fld id="{0459C166-16D3-4A25-A2F8-C51E0E346B22}" type="datetimeFigureOut">
               <a:rPr lang="en-US" smtClean="0"/>
-              <a:t>6/23/2016</a:t>
+              <a:t>7/1/2016</a:t>
             </a:fld>
             <a:endParaRPr lang="en-US"/>
           </a:p>
@@ -10085,7 +10085,7 @@
             <a:fld id="{0459C166-16D3-4A25-A2F8-C51E0E346B22}" type="datetimeFigureOut">
               <a:rPr lang="en-US" smtClean="0"/>
               <a:pPr/>
-              <a:t>6/23/2016</a:t>
+              <a:t>7/1/2016</a:t>
             </a:fld>
             <a:endParaRPr lang="en-US"/>
           </a:p>
@@ -14147,7 +14147,7 @@
           <a:p>
             <a:fld id="{0459C166-16D3-4A25-A2F8-C51E0E346B22}" type="datetimeFigureOut">
               <a:rPr lang="en-US" smtClean="0"/>
-              <a:t>6/23/2016</a:t>
+              <a:t>7/1/2016</a:t>
             </a:fld>
             <a:endParaRPr lang="en-US"/>
           </a:p>
@@ -14511,7 +14511,7 @@
           <a:p>
             <a:fld id="{0459C166-16D3-4A25-A2F8-C51E0E346B22}" type="datetimeFigureOut">
               <a:rPr lang="en-US" smtClean="0"/>
-              <a:t>6/23/2016</a:t>
+              <a:t>7/1/2016</a:t>
             </a:fld>
             <a:endParaRPr lang="en-US"/>
           </a:p>
@@ -14628,7 +14628,7 @@
           <a:p>
             <a:fld id="{0459C166-16D3-4A25-A2F8-C51E0E346B22}" type="datetimeFigureOut">
               <a:rPr lang="en-US" smtClean="0"/>
-              <a:t>6/23/2016</a:t>
+              <a:t>7/1/2016</a:t>
             </a:fld>
             <a:endParaRPr lang="en-US"/>
           </a:p>
@@ -14839,7 +14839,7 @@
           <a:p>
             <a:fld id="{0459C166-16D3-4A25-A2F8-C51E0E346B22}" type="datetimeFigureOut">
               <a:rPr lang="en-US" smtClean="0"/>
-              <a:t>6/23/2016</a:t>
+              <a:t>7/1/2016</a:t>
             </a:fld>
             <a:endParaRPr lang="en-US"/>
           </a:p>
@@ -16621,17 +16621,21 @@
           <a:p>
             <a:r>
               <a:rPr lang="en-US" dirty="0" smtClean="0"/>
-              <a:t>SLURM Linux Cluster </a:t>
+              <a:t>SLURM Linux Cluster HOL.html</a:t>
+            </a:r>
+          </a:p>
+          <a:p>
+            <a:r>
+              <a:rPr lang="en-US" dirty="0" smtClean="0"/>
+              <a:t>SLURM </a:t>
+            </a:r>
+            <a:r>
+              <a:rPr lang="en-US" dirty="0" smtClean="0"/>
+              <a:t>Docker Swarm </a:t>
             </a:r>
             <a:r>
               <a:rPr lang="en-US" dirty="0" smtClean="0"/>
               <a:t>HOL.html</a:t>
-            </a:r>
-          </a:p>
-          <a:p>
-            <a:r>
-              <a:rPr lang="en-US" dirty="0" smtClean="0"/>
-              <a:t>SLURM Linux Swarm HOL.html</a:t>
             </a:r>
             <a:endParaRPr lang="en-US" dirty="0"/>
           </a:p>

</xml_diff>

<commit_message>
Updated slides for Module 6
</commit_message>
<xml_diff>
--- a/Workshop/6. HPC/HPC and Azure Container Service.pptx
+++ b/Workshop/6. HPC/HPC and Azure Container Service.pptx
@@ -6,7 +6,7 @@
     <p:sldMasterId id="2147483663" r:id="rId2"/>
   </p:sldMasterIdLst>
   <p:notesMasterIdLst>
-    <p:notesMasterId r:id="rId19"/>
+    <p:notesMasterId r:id="rId17"/>
   </p:notesMasterIdLst>
   <p:sldIdLst>
     <p:sldId id="256" r:id="rId3"/>
@@ -19,12 +19,10 @@
     <p:sldId id="307" r:id="rId10"/>
     <p:sldId id="308" r:id="rId11"/>
     <p:sldId id="309" r:id="rId12"/>
-    <p:sldId id="310" r:id="rId13"/>
-    <p:sldId id="311" r:id="rId14"/>
-    <p:sldId id="312" r:id="rId15"/>
-    <p:sldId id="313" r:id="rId16"/>
-    <p:sldId id="295" r:id="rId17"/>
-    <p:sldId id="299" r:id="rId18"/>
+    <p:sldId id="311" r:id="rId13"/>
+    <p:sldId id="313" r:id="rId14"/>
+    <p:sldId id="295" r:id="rId15"/>
+    <p:sldId id="299" r:id="rId16"/>
   </p:sldIdLst>
   <p:sldSz cx="12192000" cy="6858000"/>
   <p:notesSz cx="6858000" cy="9144000"/>
@@ -213,7 +211,7 @@
           <a:p>
             <a:fld id="{49B60EF2-7028-489F-85D8-FE86CD7CF2A0}" type="datetimeFigureOut">
               <a:rPr lang="en-US" smtClean="0"/>
-              <a:t>7/1/2016</a:t>
+              <a:t>7/18/2016</a:t>
             </a:fld>
             <a:endParaRPr lang="en-US"/>
           </a:p>
@@ -564,6 +562,294 @@
 </p:notes>
 </file>
 
+<file path=ppt/notesSlides/notesSlide10.xml><?xml version="1.0" encoding="utf-8"?>
+<p:notes xmlns:a="http://schemas.openxmlformats.org/drawingml/2006/main" xmlns:r="http://schemas.openxmlformats.org/officeDocument/2006/relationships" xmlns:p="http://schemas.openxmlformats.org/presentationml/2006/main">
+  <p:cSld>
+    <p:spTree>
+      <p:nvGrpSpPr>
+        <p:cNvPr id="1" name=""/>
+        <p:cNvGrpSpPr/>
+        <p:nvPr/>
+      </p:nvGrpSpPr>
+      <p:grpSpPr>
+        <a:xfrm>
+          <a:off x="0" y="0"/>
+          <a:ext cx="0" cy="0"/>
+          <a:chOff x="0" y="0"/>
+          <a:chExt cx="0" cy="0"/>
+        </a:xfrm>
+      </p:grpSpPr>
+      <p:sp>
+        <p:nvSpPr>
+          <p:cNvPr id="2" name="Slide Image Placeholder 1"/>
+          <p:cNvSpPr>
+            <a:spLocks noGrp="1" noRot="1" noChangeAspect="1"/>
+          </p:cNvSpPr>
+          <p:nvPr>
+            <p:ph type="sldImg"/>
+          </p:nvPr>
+        </p:nvSpPr>
+        <p:spPr/>
+      </p:sp>
+      <p:sp>
+        <p:nvSpPr>
+          <p:cNvPr id="3" name="Notes Placeholder 2"/>
+          <p:cNvSpPr>
+            <a:spLocks noGrp="1"/>
+          </p:cNvSpPr>
+          <p:nvPr>
+            <p:ph type="body" idx="1"/>
+          </p:nvPr>
+        </p:nvSpPr>
+        <p:spPr/>
+        <p:txBody>
+          <a:bodyPr/>
+          <a:lstStyle/>
+          <a:p>
+            <a:r>
+              <a:rPr lang="en-US" dirty="0" smtClean="0"/>
+              <a:t>From the documentation: "Azure Container Service makes it simpler for you to create, configure, and manage a cluster of virtual machines that are preconfigured to run containerized applications. It uses an optimized configuration of popular open-source scheduling and orchestration tools. This enables you to use your existing skills, or draw upon a large and growing body of community expertise, to deploy and manage container-based applications on Microsoft Azure." ACS supports Linux containers and Windows containers. The latter rely</a:t>
+            </a:r>
+            <a:r>
+              <a:rPr lang="en-US" baseline="0" dirty="0" smtClean="0"/>
+              <a:t> on </a:t>
+            </a:r>
+            <a:r>
+              <a:rPr lang="en-US" dirty="0" smtClean="0"/>
+              <a:t>Windows Server 2016.</a:t>
+            </a:r>
+            <a:endParaRPr lang="en-US" dirty="0"/>
+          </a:p>
+        </p:txBody>
+      </p:sp>
+      <p:sp>
+        <p:nvSpPr>
+          <p:cNvPr id="4" name="Slide Number Placeholder 3"/>
+          <p:cNvSpPr>
+            <a:spLocks noGrp="1"/>
+          </p:cNvSpPr>
+          <p:nvPr>
+            <p:ph type="sldNum" sz="quarter" idx="10"/>
+          </p:nvPr>
+        </p:nvSpPr>
+        <p:spPr/>
+        <p:txBody>
+          <a:bodyPr/>
+          <a:lstStyle/>
+          <a:p>
+            <a:fld id="{01283FAC-A721-45A3-BBDE-EAF2B09B7CD9}" type="slidenum">
+              <a:rPr lang="en-US" smtClean="0"/>
+              <a:t>10</a:t>
+            </a:fld>
+            <a:endParaRPr lang="en-US"/>
+          </a:p>
+        </p:txBody>
+      </p:sp>
+    </p:spTree>
+    <p:extLst>
+      <p:ext uri="{BB962C8B-B14F-4D97-AF65-F5344CB8AC3E}">
+        <p14:creationId xmlns:p14="http://schemas.microsoft.com/office/powerpoint/2010/main" val="36852900"/>
+      </p:ext>
+    </p:extLst>
+  </p:cSld>
+  <p:clrMapOvr>
+    <a:masterClrMapping/>
+  </p:clrMapOvr>
+</p:notes>
+</file>
+
+<file path=ppt/notesSlides/notesSlide11.xml><?xml version="1.0" encoding="utf-8"?>
+<p:notes xmlns:a="http://schemas.openxmlformats.org/drawingml/2006/main" xmlns:r="http://schemas.openxmlformats.org/officeDocument/2006/relationships" xmlns:p="http://schemas.openxmlformats.org/presentationml/2006/main">
+  <p:cSld>
+    <p:spTree>
+      <p:nvGrpSpPr>
+        <p:cNvPr id="1" name=""/>
+        <p:cNvGrpSpPr/>
+        <p:nvPr/>
+      </p:nvGrpSpPr>
+      <p:grpSpPr>
+        <a:xfrm>
+          <a:off x="0" y="0"/>
+          <a:ext cx="0" cy="0"/>
+          <a:chOff x="0" y="0"/>
+          <a:chExt cx="0" cy="0"/>
+        </a:xfrm>
+      </p:grpSpPr>
+      <p:sp>
+        <p:nvSpPr>
+          <p:cNvPr id="2" name="Slide Image Placeholder 1"/>
+          <p:cNvSpPr>
+            <a:spLocks noGrp="1" noRot="1" noChangeAspect="1"/>
+          </p:cNvSpPr>
+          <p:nvPr>
+            <p:ph type="sldImg"/>
+          </p:nvPr>
+        </p:nvSpPr>
+        <p:spPr/>
+      </p:sp>
+      <p:sp>
+        <p:nvSpPr>
+          <p:cNvPr id="3" name="Notes Placeholder 2"/>
+          <p:cNvSpPr>
+            <a:spLocks noGrp="1"/>
+          </p:cNvSpPr>
+          <p:nvPr>
+            <p:ph type="body" idx="1"/>
+          </p:nvPr>
+        </p:nvSpPr>
+        <p:spPr/>
+        <p:txBody>
+          <a:bodyPr/>
+          <a:lstStyle/>
+          <a:p>
+            <a:r>
+              <a:rPr lang="en-US" dirty="0" smtClean="0"/>
+              <a:t>Here's what happens in Azure</a:t>
+            </a:r>
+            <a:r>
+              <a:rPr lang="en-US" baseline="0" dirty="0" smtClean="0"/>
+              <a:t> when you create an Azure Container Service with Docker Swarm as the orchestrator. Azure creates one or more master VMs to control the "swarm" of containers, as well as a Virtual Machine Scale Set, which provides the "agent" VMs in which containers run. All these VMs communicate over a private virtual network. To communicate with Docker Swarm in a master VM from a Docker client running on a local machine, you establish an SSH tunnel that forwards the local port 22375 to port 2375 in the VM (via SSH port 2200). This allows you to execute local commands that load container images and run containers in the cloud. Docker Swarm manages the container instances in the agent VMs as well as the agent VMs themselves. You don't have to know this to use Azure Container Service, but it does help explain various port forwarding commands that you employ when running the Docker client on a local machine connected to Azure.</a:t>
+            </a:r>
+            <a:endParaRPr lang="en-US" dirty="0"/>
+          </a:p>
+        </p:txBody>
+      </p:sp>
+      <p:sp>
+        <p:nvSpPr>
+          <p:cNvPr id="4" name="Slide Number Placeholder 3"/>
+          <p:cNvSpPr>
+            <a:spLocks noGrp="1"/>
+          </p:cNvSpPr>
+          <p:nvPr>
+            <p:ph type="sldNum" sz="quarter" idx="10"/>
+          </p:nvPr>
+        </p:nvSpPr>
+        <p:spPr/>
+        <p:txBody>
+          <a:bodyPr/>
+          <a:lstStyle/>
+          <a:p>
+            <a:fld id="{01283FAC-A721-45A3-BBDE-EAF2B09B7CD9}" type="slidenum">
+              <a:rPr lang="en-US" smtClean="0"/>
+              <a:t>11</a:t>
+            </a:fld>
+            <a:endParaRPr lang="en-US"/>
+          </a:p>
+        </p:txBody>
+      </p:sp>
+    </p:spTree>
+    <p:extLst>
+      <p:ext uri="{BB962C8B-B14F-4D97-AF65-F5344CB8AC3E}">
+        <p14:creationId xmlns:p14="http://schemas.microsoft.com/office/powerpoint/2010/main" val="2302495390"/>
+      </p:ext>
+    </p:extLst>
+  </p:cSld>
+  <p:clrMapOvr>
+    <a:masterClrMapping/>
+  </p:clrMapOvr>
+</p:notes>
+</file>
+
+<file path=ppt/notesSlides/notesSlide12.xml><?xml version="1.0" encoding="utf-8"?>
+<p:notes xmlns:a="http://schemas.openxmlformats.org/drawingml/2006/main" xmlns:r="http://schemas.openxmlformats.org/officeDocument/2006/relationships" xmlns:p="http://schemas.openxmlformats.org/presentationml/2006/main">
+  <p:cSld>
+    <p:spTree>
+      <p:nvGrpSpPr>
+        <p:cNvPr id="1" name=""/>
+        <p:cNvGrpSpPr/>
+        <p:nvPr/>
+      </p:nvGrpSpPr>
+      <p:grpSpPr>
+        <a:xfrm>
+          <a:off x="0" y="0"/>
+          <a:ext cx="0" cy="0"/>
+          <a:chOff x="0" y="0"/>
+          <a:chExt cx="0" cy="0"/>
+        </a:xfrm>
+      </p:grpSpPr>
+      <p:sp>
+        <p:nvSpPr>
+          <p:cNvPr id="2" name="Slide Image Placeholder 1"/>
+          <p:cNvSpPr>
+            <a:spLocks noGrp="1" noRot="1" noChangeAspect="1"/>
+          </p:cNvSpPr>
+          <p:nvPr>
+            <p:ph type="sldImg"/>
+          </p:nvPr>
+        </p:nvSpPr>
+        <p:spPr/>
+      </p:sp>
+      <p:sp>
+        <p:nvSpPr>
+          <p:cNvPr id="3" name="Notes Placeholder 2"/>
+          <p:cNvSpPr>
+            <a:spLocks noGrp="1"/>
+          </p:cNvSpPr>
+          <p:nvPr>
+            <p:ph type="body" idx="1"/>
+          </p:nvPr>
+        </p:nvSpPr>
+        <p:spPr/>
+        <p:txBody>
+          <a:bodyPr/>
+          <a:lstStyle/>
+          <a:p>
+            <a:r>
+              <a:rPr lang="en-US" dirty="0" smtClean="0"/>
+              <a:t>The Docker Client,</a:t>
+            </a:r>
+            <a:r>
+              <a:rPr lang="en-US" baseline="0" dirty="0" smtClean="0"/>
+              <a:t> also known as the Docker CLI, is the primary tool you use to manage Docker containers. You can download container images from repositories such as Docker Hub, build container images, run container instances, list container images and instances, and much more. After connecting to Azure Container Service using SSH, you can use port forwarding to execute commands locally that act on an Azure Container Service running in the cloud. In this example, the -H switch used with the </a:t>
+            </a:r>
+            <a:r>
+              <a:rPr lang="en-US" baseline="0" dirty="0" err="1" smtClean="0"/>
+              <a:t>docker</a:t>
+            </a:r>
+            <a:r>
+              <a:rPr lang="en-US" baseline="0" dirty="0" smtClean="0"/>
+              <a:t> commands forwards commands sent to port 22375 on localhost to the Azure Container Services via SSH.</a:t>
+            </a:r>
+            <a:endParaRPr lang="en-US" dirty="0"/>
+          </a:p>
+        </p:txBody>
+      </p:sp>
+      <p:sp>
+        <p:nvSpPr>
+          <p:cNvPr id="4" name="Slide Number Placeholder 3"/>
+          <p:cNvSpPr>
+            <a:spLocks noGrp="1"/>
+          </p:cNvSpPr>
+          <p:nvPr>
+            <p:ph type="sldNum" sz="quarter" idx="10"/>
+          </p:nvPr>
+        </p:nvSpPr>
+        <p:spPr/>
+        <p:txBody>
+          <a:bodyPr/>
+          <a:lstStyle/>
+          <a:p>
+            <a:fld id="{01283FAC-A721-45A3-BBDE-EAF2B09B7CD9}" type="slidenum">
+              <a:rPr lang="en-US" smtClean="0"/>
+              <a:t>12</a:t>
+            </a:fld>
+            <a:endParaRPr lang="en-US"/>
+          </a:p>
+        </p:txBody>
+      </p:sp>
+    </p:spTree>
+    <p:extLst>
+      <p:ext uri="{BB962C8B-B14F-4D97-AF65-F5344CB8AC3E}">
+        <p14:creationId xmlns:p14="http://schemas.microsoft.com/office/powerpoint/2010/main" val="999235491"/>
+      </p:ext>
+    </p:extLst>
+  </p:cSld>
+  <p:clrMapOvr>
+    <a:masterClrMapping/>
+  </p:clrMapOvr>
+</p:notes>
+</file>
+
 <file path=ppt/notesSlides/notesSlide2.xml><?xml version="1.0" encoding="utf-8"?>
 <p:notes xmlns:a="http://schemas.openxmlformats.org/drawingml/2006/main" xmlns:r="http://schemas.openxmlformats.org/officeDocument/2006/relationships" xmlns:p="http://schemas.openxmlformats.org/presentationml/2006/main">
   <p:cSld>
@@ -1407,6 +1693,206 @@
     <p:extLst>
       <p:ext uri="{BB962C8B-B14F-4D97-AF65-F5344CB8AC3E}">
         <p14:creationId xmlns:p14="http://schemas.microsoft.com/office/powerpoint/2010/main" val="2236143850"/>
+      </p:ext>
+    </p:extLst>
+  </p:cSld>
+  <p:clrMapOvr>
+    <a:masterClrMapping/>
+  </p:clrMapOvr>
+</p:notes>
+</file>
+
+<file path=ppt/notesSlides/notesSlide8.xml><?xml version="1.0" encoding="utf-8"?>
+<p:notes xmlns:a="http://schemas.openxmlformats.org/drawingml/2006/main" xmlns:r="http://schemas.openxmlformats.org/officeDocument/2006/relationships" xmlns:p="http://schemas.openxmlformats.org/presentationml/2006/main">
+  <p:cSld>
+    <p:spTree>
+      <p:nvGrpSpPr>
+        <p:cNvPr id="1" name=""/>
+        <p:cNvGrpSpPr/>
+        <p:nvPr/>
+      </p:nvGrpSpPr>
+      <p:grpSpPr>
+        <a:xfrm>
+          <a:off x="0" y="0"/>
+          <a:ext cx="0" cy="0"/>
+          <a:chOff x="0" y="0"/>
+          <a:chExt cx="0" cy="0"/>
+        </a:xfrm>
+      </p:grpSpPr>
+      <p:sp>
+        <p:nvSpPr>
+          <p:cNvPr id="2" name="Slide Image Placeholder 1"/>
+          <p:cNvSpPr>
+            <a:spLocks noGrp="1" noRot="1" noChangeAspect="1"/>
+          </p:cNvSpPr>
+          <p:nvPr>
+            <p:ph type="sldImg"/>
+          </p:nvPr>
+        </p:nvSpPr>
+        <p:spPr/>
+      </p:sp>
+      <p:sp>
+        <p:nvSpPr>
+          <p:cNvPr id="3" name="Notes Placeholder 2"/>
+          <p:cNvSpPr>
+            <a:spLocks noGrp="1"/>
+          </p:cNvSpPr>
+          <p:nvPr>
+            <p:ph type="body" idx="1"/>
+          </p:nvPr>
+        </p:nvSpPr>
+        <p:spPr/>
+        <p:txBody>
+          <a:bodyPr/>
+          <a:lstStyle/>
+          <a:p>
+            <a:r>
+              <a:rPr lang="en-US" dirty="0" smtClean="0"/>
+              <a:t>A</a:t>
+            </a:r>
+            <a:r>
+              <a:rPr lang="en-US" baseline="0" dirty="0" smtClean="0"/>
+              <a:t> virtual machine is -- well -- a virtualized machine created and managed by a hypervisor such as </a:t>
+            </a:r>
+            <a:r>
+              <a:rPr lang="en-US" baseline="0" dirty="0" err="1" smtClean="0"/>
+              <a:t>VirtualBox</a:t>
+            </a:r>
+            <a:r>
+              <a:rPr lang="en-US" baseline="0" dirty="0" smtClean="0"/>
+              <a:t> or Hyper-V. Even though a VM runs on a machine that has an operating system, each VM requires its own complete operating system, even if it's the same operating system as the host OS. VMs offer a very high degree of isolation, but at a cost: longer startup times, lower portability (ever tried to move a 127 GB virtual hard disk, or VHD, from one PC to another?), and higher memory requirements. Containers, by contrast, leverage the operating system that is already in place but offer nearly as much separation. RAM requirements are lower since the OS isn't being duplicated in each container, and cost is lower, too, because while cloud platforms typically charge for each VM, a single VM can host multiple container instances.</a:t>
+            </a:r>
+            <a:endParaRPr lang="en-US" dirty="0"/>
+          </a:p>
+        </p:txBody>
+      </p:sp>
+      <p:sp>
+        <p:nvSpPr>
+          <p:cNvPr id="4" name="Slide Number Placeholder 3"/>
+          <p:cNvSpPr>
+            <a:spLocks noGrp="1"/>
+          </p:cNvSpPr>
+          <p:nvPr>
+            <p:ph type="sldNum" sz="quarter" idx="10"/>
+          </p:nvPr>
+        </p:nvSpPr>
+        <p:spPr/>
+        <p:txBody>
+          <a:bodyPr/>
+          <a:lstStyle/>
+          <a:p>
+            <a:fld id="{01283FAC-A721-45A3-BBDE-EAF2B09B7CD9}" type="slidenum">
+              <a:rPr lang="en-US" smtClean="0"/>
+              <a:t>8</a:t>
+            </a:fld>
+            <a:endParaRPr lang="en-US"/>
+          </a:p>
+        </p:txBody>
+      </p:sp>
+    </p:spTree>
+    <p:extLst>
+      <p:ext uri="{BB962C8B-B14F-4D97-AF65-F5344CB8AC3E}">
+        <p14:creationId xmlns:p14="http://schemas.microsoft.com/office/powerpoint/2010/main" val="3918904550"/>
+      </p:ext>
+    </p:extLst>
+  </p:cSld>
+  <p:clrMapOvr>
+    <a:masterClrMapping/>
+  </p:clrMapOvr>
+</p:notes>
+</file>
+
+<file path=ppt/notesSlides/notesSlide9.xml><?xml version="1.0" encoding="utf-8"?>
+<p:notes xmlns:a="http://schemas.openxmlformats.org/drawingml/2006/main" xmlns:r="http://schemas.openxmlformats.org/officeDocument/2006/relationships" xmlns:p="http://schemas.openxmlformats.org/presentationml/2006/main">
+  <p:cSld>
+    <p:spTree>
+      <p:nvGrpSpPr>
+        <p:cNvPr id="1" name=""/>
+        <p:cNvGrpSpPr/>
+        <p:nvPr/>
+      </p:nvGrpSpPr>
+      <p:grpSpPr>
+        <a:xfrm>
+          <a:off x="0" y="0"/>
+          <a:ext cx="0" cy="0"/>
+          <a:chOff x="0" y="0"/>
+          <a:chExt cx="0" cy="0"/>
+        </a:xfrm>
+      </p:grpSpPr>
+      <p:sp>
+        <p:nvSpPr>
+          <p:cNvPr id="2" name="Slide Image Placeholder 1"/>
+          <p:cNvSpPr>
+            <a:spLocks noGrp="1" noRot="1" noChangeAspect="1"/>
+          </p:cNvSpPr>
+          <p:nvPr>
+            <p:ph type="sldImg"/>
+          </p:nvPr>
+        </p:nvSpPr>
+        <p:spPr/>
+      </p:sp>
+      <p:sp>
+        <p:nvSpPr>
+          <p:cNvPr id="3" name="Notes Placeholder 2"/>
+          <p:cNvSpPr>
+            <a:spLocks noGrp="1"/>
+          </p:cNvSpPr>
+          <p:nvPr>
+            <p:ph type="body" idx="1"/>
+          </p:nvPr>
+        </p:nvSpPr>
+        <p:spPr/>
+        <p:txBody>
+          <a:bodyPr/>
+          <a:lstStyle/>
+          <a:p>
+            <a:r>
+              <a:rPr lang="en-US" dirty="0" smtClean="0"/>
+              <a:t>Docker (www.docker.com) isn't the world's only containerization platform, but it is the most popular. It is free, open-source,</a:t>
+            </a:r>
+            <a:r>
+              <a:rPr lang="en-US" baseline="0" dirty="0" smtClean="0"/>
+              <a:t> and Linux-based, with Windows support (Windows Server 2016) in the works. </a:t>
+            </a:r>
+            <a:r>
+              <a:rPr lang="en-US" dirty="0" smtClean="0"/>
+              <a:t>It has earned massive</a:t>
+            </a:r>
+            <a:r>
+              <a:rPr lang="en-US" baseline="0" dirty="0" smtClean="0"/>
+              <a:t> mindshare in the developer community. And with Azure Container Service, you can deploy Docker containers to Azure with minimal effort. Moreover, Docker containers are easily moved between Azure and Amazon Web Services (AWS), affording developers portability between cloud platforms.</a:t>
+            </a:r>
+            <a:endParaRPr lang="en-US" dirty="0"/>
+          </a:p>
+        </p:txBody>
+      </p:sp>
+      <p:sp>
+        <p:nvSpPr>
+          <p:cNvPr id="4" name="Slide Number Placeholder 3"/>
+          <p:cNvSpPr>
+            <a:spLocks noGrp="1"/>
+          </p:cNvSpPr>
+          <p:nvPr>
+            <p:ph type="sldNum" sz="quarter" idx="10"/>
+          </p:nvPr>
+        </p:nvSpPr>
+        <p:spPr/>
+        <p:txBody>
+          <a:bodyPr/>
+          <a:lstStyle/>
+          <a:p>
+            <a:fld id="{01283FAC-A721-45A3-BBDE-EAF2B09B7CD9}" type="slidenum">
+              <a:rPr lang="en-US" smtClean="0"/>
+              <a:t>9</a:t>
+            </a:fld>
+            <a:endParaRPr lang="en-US"/>
+          </a:p>
+        </p:txBody>
+      </p:sp>
+    </p:spTree>
+    <p:extLst>
+      <p:ext uri="{BB962C8B-B14F-4D97-AF65-F5344CB8AC3E}">
+        <p14:creationId xmlns:p14="http://schemas.microsoft.com/office/powerpoint/2010/main" val="4017007276"/>
       </p:ext>
     </p:extLst>
   </p:cSld>
@@ -1563,7 +2049,7 @@
           <a:p>
             <a:fld id="{0459C166-16D3-4A25-A2F8-C51E0E346B22}" type="datetimeFigureOut">
               <a:rPr lang="en-US" smtClean="0"/>
-              <a:t>7/1/2016</a:t>
+              <a:t>7/18/2016</a:t>
             </a:fld>
             <a:endParaRPr lang="en-US"/>
           </a:p>
@@ -1658,7 +2144,7 @@
           <a:p>
             <a:fld id="{0459C166-16D3-4A25-A2F8-C51E0E346B22}" type="datetimeFigureOut">
               <a:rPr lang="en-US" smtClean="0"/>
-              <a:t>7/1/2016</a:t>
+              <a:t>7/18/2016</a:t>
             </a:fld>
             <a:endParaRPr lang="en-US"/>
           </a:p>
@@ -1933,7 +2419,7 @@
           <a:p>
             <a:fld id="{0459C166-16D3-4A25-A2F8-C51E0E346B22}" type="datetimeFigureOut">
               <a:rPr lang="en-US" smtClean="0"/>
-              <a:t>7/1/2016</a:t>
+              <a:t>7/18/2016</a:t>
             </a:fld>
             <a:endParaRPr lang="en-US"/>
           </a:p>
@@ -2185,7 +2671,7 @@
           <a:p>
             <a:fld id="{0459C166-16D3-4A25-A2F8-C51E0E346B22}" type="datetimeFigureOut">
               <a:rPr lang="en-US" smtClean="0"/>
-              <a:t>7/1/2016</a:t>
+              <a:t>7/18/2016</a:t>
             </a:fld>
             <a:endParaRPr lang="en-US"/>
           </a:p>
@@ -2353,7 +2839,7 @@
           <a:p>
             <a:fld id="{0459C166-16D3-4A25-A2F8-C51E0E346B22}" type="datetimeFigureOut">
               <a:rPr lang="en-US" smtClean="0"/>
-              <a:t>7/1/2016</a:t>
+              <a:t>7/18/2016</a:t>
             </a:fld>
             <a:endParaRPr lang="en-US"/>
           </a:p>
@@ -2531,7 +3017,7 @@
           <a:p>
             <a:fld id="{0459C166-16D3-4A25-A2F8-C51E0E346B22}" type="datetimeFigureOut">
               <a:rPr lang="en-US" smtClean="0"/>
-              <a:t>7/1/2016</a:t>
+              <a:t>7/18/2016</a:t>
             </a:fld>
             <a:endParaRPr lang="en-US"/>
           </a:p>
@@ -4458,7 +4944,7 @@
           <a:p>
             <a:fld id="{0459C166-16D3-4A25-A2F8-C51E0E346B22}" type="datetimeFigureOut">
               <a:rPr lang="en-US" smtClean="0"/>
-              <a:t>7/1/2016</a:t>
+              <a:t>7/18/2016</a:t>
             </a:fld>
             <a:endParaRPr lang="en-US"/>
           </a:p>
@@ -10085,7 +10571,7 @@
             <a:fld id="{0459C166-16D3-4A25-A2F8-C51E0E346B22}" type="datetimeFigureOut">
               <a:rPr lang="en-US" smtClean="0"/>
               <a:pPr/>
-              <a:t>7/1/2016</a:t>
+              <a:t>7/18/2016</a:t>
             </a:fld>
             <a:endParaRPr lang="en-US"/>
           </a:p>
@@ -14147,7 +14633,7 @@
           <a:p>
             <a:fld id="{0459C166-16D3-4A25-A2F8-C51E0E346B22}" type="datetimeFigureOut">
               <a:rPr lang="en-US" smtClean="0"/>
-              <a:t>7/1/2016</a:t>
+              <a:t>7/18/2016</a:t>
             </a:fld>
             <a:endParaRPr lang="en-US"/>
           </a:p>
@@ -14511,7 +14997,7 @@
           <a:p>
             <a:fld id="{0459C166-16D3-4A25-A2F8-C51E0E346B22}" type="datetimeFigureOut">
               <a:rPr lang="en-US" smtClean="0"/>
-              <a:t>7/1/2016</a:t>
+              <a:t>7/18/2016</a:t>
             </a:fld>
             <a:endParaRPr lang="en-US"/>
           </a:p>
@@ -14628,7 +15114,7 @@
           <a:p>
             <a:fld id="{0459C166-16D3-4A25-A2F8-C51E0E346B22}" type="datetimeFigureOut">
               <a:rPr lang="en-US" smtClean="0"/>
-              <a:t>7/1/2016</a:t>
+              <a:t>7/18/2016</a:t>
             </a:fld>
             <a:endParaRPr lang="en-US"/>
           </a:p>
@@ -14839,7 +15325,7 @@
           <a:p>
             <a:fld id="{0459C166-16D3-4A25-A2F8-C51E0E346B22}" type="datetimeFigureOut">
               <a:rPr lang="en-US" smtClean="0"/>
-              <a:t>7/1/2016</a:t>
+              <a:t>7/18/2016</a:t>
             </a:fld>
             <a:endParaRPr lang="en-US"/>
           </a:p>
@@ -16142,7 +16628,14 @@
             </a:r>
             <a:r>
               <a:rPr lang="en-US" dirty="0" smtClean="0"/>
-              <a:t>and Azure Container Service</a:t>
+              <a:t>and</a:t>
+            </a:r>
+            <a:br>
+              <a:rPr lang="en-US" dirty="0" smtClean="0"/>
+            </a:br>
+            <a:r>
+              <a:rPr lang="en-US" dirty="0" smtClean="0"/>
+              <a:t>Azure Container Service</a:t>
             </a:r>
             <a:endParaRPr lang="en-US" dirty="0"/>
           </a:p>
@@ -16262,10 +16755,43 @@
           <a:bodyPr/>
           <a:lstStyle/>
           <a:p>
-            <a:endParaRPr lang="en-US"/>
-          </a:p>
-        </p:txBody>
-      </p:sp>
+            <a:r>
+              <a:rPr lang="en-US" dirty="0" smtClean="0"/>
+              <a:t>Provides robust, ready-to-use Docker hosting environment</a:t>
+            </a:r>
+          </a:p>
+          <a:p>
+            <a:r>
+              <a:rPr lang="en-US" dirty="0" smtClean="0"/>
+              <a:t>Uses open-source orchestration tools (DC/OS and Swarm)</a:t>
+            </a:r>
+          </a:p>
+        </p:txBody>
+      </p:sp>
+      <p:pic>
+        <p:nvPicPr>
+          <p:cNvPr id="7" name="Picture 6"/>
+          <p:cNvPicPr>
+            <a:picLocks noChangeAspect="1"/>
+          </p:cNvPicPr>
+          <p:nvPr/>
+        </p:nvPicPr>
+        <p:blipFill>
+          <a:blip r:embed="rId3"/>
+          <a:stretch>
+            <a:fillRect/>
+          </a:stretch>
+        </p:blipFill>
+        <p:spPr>
+          <a:xfrm>
+            <a:off x="2257396" y="3052415"/>
+            <a:ext cx="7677208" cy="3439082"/>
+          </a:xfrm>
+          <a:prstGeom prst="rect">
+            <a:avLst/>
+          </a:prstGeom>
+        </p:spPr>
+      </p:pic>
     </p:spTree>
     <p:extLst>
       <p:ext uri="{BB962C8B-B14F-4D97-AF65-F5344CB8AC3E}">
@@ -16313,35 +16839,46 @@
           <a:p>
             <a:r>
               <a:rPr lang="en-US" dirty="0" smtClean="0"/>
-              <a:t>TBD</a:t>
+              <a:t>Clustering with Docker Swarm</a:t>
             </a:r>
             <a:endParaRPr lang="en-US" dirty="0"/>
           </a:p>
         </p:txBody>
       </p:sp>
-      <p:sp>
-        <p:nvSpPr>
-          <p:cNvPr id="3" name="Content Placeholder 2"/>
-          <p:cNvSpPr>
-            <a:spLocks noGrp="1"/>
-          </p:cNvSpPr>
-          <p:nvPr>
-            <p:ph idx="1"/>
-          </p:nvPr>
-        </p:nvSpPr>
-        <p:spPr/>
-        <p:txBody>
-          <a:bodyPr/>
-          <a:lstStyle/>
-          <a:p>
-            <a:endParaRPr lang="en-US"/>
-          </a:p>
-        </p:txBody>
-      </p:sp>
+      <p:pic>
+        <p:nvPicPr>
+          <p:cNvPr id="4" name="Picture 3"/>
+          <p:cNvPicPr>
+            <a:picLocks noChangeAspect="1"/>
+          </p:cNvPicPr>
+          <p:nvPr/>
+        </p:nvPicPr>
+        <p:blipFill>
+          <a:blip r:embed="rId3">
+            <a:extLst>
+              <a:ext uri="{28A0092B-C50C-407E-A947-70E740481C1C}">
+                <a14:useLocalDpi xmlns:a14="http://schemas.microsoft.com/office/drawing/2010/main" val="0"/>
+              </a:ext>
+            </a:extLst>
+          </a:blip>
+          <a:stretch>
+            <a:fillRect/>
+          </a:stretch>
+        </p:blipFill>
+        <p:spPr>
+          <a:xfrm>
+            <a:off x="2352325" y="2004044"/>
+            <a:ext cx="7487349" cy="3850346"/>
+          </a:xfrm>
+          <a:prstGeom prst="rect">
+            <a:avLst/>
+          </a:prstGeom>
+        </p:spPr>
+      </p:pic>
     </p:spTree>
     <p:extLst>
       <p:ext uri="{BB962C8B-B14F-4D97-AF65-F5344CB8AC3E}">
-        <p14:creationId xmlns:p14="http://schemas.microsoft.com/office/powerpoint/2010/main" val="4135089985"/>
+        <p14:creationId xmlns:p14="http://schemas.microsoft.com/office/powerpoint/2010/main" val="1442308448"/>
       </p:ext>
     </p:extLst>
   </p:cSld>
@@ -16384,9 +16921,10 @@
           <a:lstStyle/>
           <a:p>
             <a:r>
-              <a:rPr lang="en-US" dirty="0"/>
-              <a:t>TBD</a:t>
-            </a:r>
+              <a:rPr lang="en-US" dirty="0" smtClean="0"/>
+              <a:t>Docker Client</a:t>
+            </a:r>
+            <a:endParaRPr lang="en-US" dirty="0"/>
           </a:p>
         </p:txBody>
       </p:sp>
@@ -16405,14 +16943,42 @@
           <a:bodyPr/>
           <a:lstStyle/>
           <a:p>
-            <a:endParaRPr lang="en-US"/>
-          </a:p>
-        </p:txBody>
-      </p:sp>
+            <a:r>
+              <a:rPr lang="en-US" dirty="0" smtClean="0"/>
+              <a:t>Command-line interface for Docker, available for Linux, OS X, and Windows (available separately or as part of Docker Toolbox)</a:t>
+            </a:r>
+            <a:endParaRPr lang="en-US" dirty="0"/>
+          </a:p>
+        </p:txBody>
+      </p:sp>
+      <p:pic>
+        <p:nvPicPr>
+          <p:cNvPr id="4" name="Picture 3"/>
+          <p:cNvPicPr>
+            <a:picLocks noChangeAspect="1"/>
+          </p:cNvPicPr>
+          <p:nvPr/>
+        </p:nvPicPr>
+        <p:blipFill>
+          <a:blip r:embed="rId3"/>
+          <a:stretch>
+            <a:fillRect/>
+          </a:stretch>
+        </p:blipFill>
+        <p:spPr>
+          <a:xfrm>
+            <a:off x="2957512" y="2995613"/>
+            <a:ext cx="6276975" cy="3181350"/>
+          </a:xfrm>
+          <a:prstGeom prst="rect">
+            <a:avLst/>
+          </a:prstGeom>
+        </p:spPr>
+      </p:pic>
     </p:spTree>
     <p:extLst>
       <p:ext uri="{BB962C8B-B14F-4D97-AF65-F5344CB8AC3E}">
-        <p14:creationId xmlns:p14="http://schemas.microsoft.com/office/powerpoint/2010/main" val="1442308448"/>
+        <p14:creationId xmlns:p14="http://schemas.microsoft.com/office/powerpoint/2010/main" val="3822169245"/>
       </p:ext>
     </p:extLst>
   </p:cSld>
@@ -16441,148 +17007,6 @@
       </p:grpSpPr>
       <p:sp>
         <p:nvSpPr>
-          <p:cNvPr id="2" name="Title 1"/>
-          <p:cNvSpPr>
-            <a:spLocks noGrp="1"/>
-          </p:cNvSpPr>
-          <p:nvPr>
-            <p:ph type="title"/>
-          </p:nvPr>
-        </p:nvSpPr>
-        <p:spPr/>
-        <p:txBody>
-          <a:bodyPr/>
-          <a:lstStyle/>
-          <a:p>
-            <a:r>
-              <a:rPr lang="en-US" dirty="0"/>
-              <a:t>TBD</a:t>
-            </a:r>
-          </a:p>
-        </p:txBody>
-      </p:sp>
-      <p:sp>
-        <p:nvSpPr>
-          <p:cNvPr id="3" name="Content Placeholder 2"/>
-          <p:cNvSpPr>
-            <a:spLocks noGrp="1"/>
-          </p:cNvSpPr>
-          <p:nvPr>
-            <p:ph idx="1"/>
-          </p:nvPr>
-        </p:nvSpPr>
-        <p:spPr/>
-        <p:txBody>
-          <a:bodyPr/>
-          <a:lstStyle/>
-          <a:p>
-            <a:endParaRPr lang="en-US"/>
-          </a:p>
-        </p:txBody>
-      </p:sp>
-    </p:spTree>
-    <p:extLst>
-      <p:ext uri="{BB962C8B-B14F-4D97-AF65-F5344CB8AC3E}">
-        <p14:creationId xmlns:p14="http://schemas.microsoft.com/office/powerpoint/2010/main" val="1043915630"/>
-      </p:ext>
-    </p:extLst>
-  </p:cSld>
-  <p:clrMapOvr>
-    <a:masterClrMapping/>
-  </p:clrMapOvr>
-</p:sld>
-</file>
-
-<file path=ppt/slides/slide14.xml><?xml version="1.0" encoding="utf-8"?>
-<p:sld xmlns:a="http://schemas.openxmlformats.org/drawingml/2006/main" xmlns:r="http://schemas.openxmlformats.org/officeDocument/2006/relationships" xmlns:p="http://schemas.openxmlformats.org/presentationml/2006/main">
-  <p:cSld>
-    <p:spTree>
-      <p:nvGrpSpPr>
-        <p:cNvPr id="1" name=""/>
-        <p:cNvGrpSpPr/>
-        <p:nvPr/>
-      </p:nvGrpSpPr>
-      <p:grpSpPr>
-        <a:xfrm>
-          <a:off x="0" y="0"/>
-          <a:ext cx="0" cy="0"/>
-          <a:chOff x="0" y="0"/>
-          <a:chExt cx="0" cy="0"/>
-        </a:xfrm>
-      </p:grpSpPr>
-      <p:sp>
-        <p:nvSpPr>
-          <p:cNvPr id="2" name="Title 1"/>
-          <p:cNvSpPr>
-            <a:spLocks noGrp="1"/>
-          </p:cNvSpPr>
-          <p:nvPr>
-            <p:ph type="title"/>
-          </p:nvPr>
-        </p:nvSpPr>
-        <p:spPr/>
-        <p:txBody>
-          <a:bodyPr/>
-          <a:lstStyle/>
-          <a:p>
-            <a:r>
-              <a:rPr lang="en-US" dirty="0"/>
-              <a:t>TBD</a:t>
-            </a:r>
-          </a:p>
-        </p:txBody>
-      </p:sp>
-      <p:sp>
-        <p:nvSpPr>
-          <p:cNvPr id="3" name="Content Placeholder 2"/>
-          <p:cNvSpPr>
-            <a:spLocks noGrp="1"/>
-          </p:cNvSpPr>
-          <p:nvPr>
-            <p:ph idx="1"/>
-          </p:nvPr>
-        </p:nvSpPr>
-        <p:spPr/>
-        <p:txBody>
-          <a:bodyPr/>
-          <a:lstStyle/>
-          <a:p>
-            <a:endParaRPr lang="en-US"/>
-          </a:p>
-        </p:txBody>
-      </p:sp>
-    </p:spTree>
-    <p:extLst>
-      <p:ext uri="{BB962C8B-B14F-4D97-AF65-F5344CB8AC3E}">
-        <p14:creationId xmlns:p14="http://schemas.microsoft.com/office/powerpoint/2010/main" val="3822169245"/>
-      </p:ext>
-    </p:extLst>
-  </p:cSld>
-  <p:clrMapOvr>
-    <a:masterClrMapping/>
-  </p:clrMapOvr>
-</p:sld>
-</file>
-
-<file path=ppt/slides/slide15.xml><?xml version="1.0" encoding="utf-8"?>
-<p:sld xmlns:a="http://schemas.openxmlformats.org/drawingml/2006/main" xmlns:r="http://schemas.openxmlformats.org/officeDocument/2006/relationships" xmlns:p="http://schemas.openxmlformats.org/presentationml/2006/main">
-  <p:cSld>
-    <p:spTree>
-      <p:nvGrpSpPr>
-        <p:cNvPr id="1" name=""/>
-        <p:cNvGrpSpPr/>
-        <p:nvPr/>
-      </p:nvGrpSpPr>
-      <p:grpSpPr>
-        <a:xfrm>
-          <a:off x="0" y="0"/>
-          <a:ext cx="0" cy="0"/>
-          <a:chOff x="0" y="0"/>
-          <a:chExt cx="0" cy="0"/>
-        </a:xfrm>
-      </p:grpSpPr>
-      <p:sp>
-        <p:nvSpPr>
           <p:cNvPr id="4" name="Title 3"/>
           <p:cNvSpPr>
             <a:spLocks noGrp="1"/>
@@ -16627,15 +17051,7 @@
           <a:p>
             <a:r>
               <a:rPr lang="en-US" dirty="0" smtClean="0"/>
-              <a:t>SLURM </a:t>
-            </a:r>
-            <a:r>
-              <a:rPr lang="en-US" dirty="0" smtClean="0"/>
-              <a:t>Docker Swarm </a:t>
-            </a:r>
-            <a:r>
-              <a:rPr lang="en-US" dirty="0" smtClean="0"/>
-              <a:t>HOL.html</a:t>
+              <a:t>SLURM Docker Swarm HOL.html</a:t>
             </a:r>
             <a:endParaRPr lang="en-US" dirty="0"/>
           </a:p>
@@ -16654,7 +17070,7 @@
 </p:sld>
 </file>
 
-<file path=ppt/slides/slide16.xml><?xml version="1.0" encoding="utf-8"?>
+<file path=ppt/slides/slide14.xml><?xml version="1.0" encoding="utf-8"?>
 <p:sld xmlns:a="http://schemas.openxmlformats.org/drawingml/2006/main" xmlns:r="http://schemas.openxmlformats.org/officeDocument/2006/relationships" xmlns:p="http://schemas.openxmlformats.org/presentationml/2006/main">
   <p:cSld>
     <p:spTree>
@@ -20753,8 +21169,13 @@
             <a:pPr lvl="1"/>
             <a:r>
               <a:rPr lang="en-US" dirty="0"/>
-              <a:t>Deployment templates specify all the resources — VMs, switches, storage accounts, etc. — to be provisioned</a:t>
-            </a:r>
+              <a:t>Deployment templates specify all the resources — VMs, switches, storage accounts, etc. — to be </a:t>
+            </a:r>
+            <a:r>
+              <a:rPr lang="en-US" dirty="0" smtClean="0"/>
+              <a:t>provisioned using JSON syntax</a:t>
+            </a:r>
+            <a:endParaRPr lang="en-US" dirty="0"/>
           </a:p>
           <a:p>
             <a:pPr lvl="1"/>
@@ -21217,7 +21638,1133 @@
           <a:bodyPr/>
           <a:lstStyle/>
           <a:p>
-            <a:endParaRPr lang="en-US"/>
+            <a:r>
+              <a:rPr lang="en-US" dirty="0" smtClean="0"/>
+              <a:t>Lightweight alternative to virtual machines</a:t>
+            </a:r>
+          </a:p>
+          <a:p>
+            <a:r>
+              <a:rPr lang="en-US" dirty="0" smtClean="0"/>
+              <a:t>Smaller, less expensive, faster to start up, and self-contained</a:t>
+            </a:r>
+          </a:p>
+          <a:p>
+            <a:pPr lvl="1"/>
+            <a:endParaRPr lang="en-US" dirty="0"/>
+          </a:p>
+        </p:txBody>
+      </p:sp>
+      <p:sp>
+        <p:nvSpPr>
+          <p:cNvPr id="4" name="Rectangle 3"/>
+          <p:cNvSpPr/>
+          <p:nvPr/>
+        </p:nvSpPr>
+        <p:spPr>
+          <a:xfrm>
+            <a:off x="1304693" y="5965724"/>
+            <a:ext cx="4415882" cy="422478"/>
+          </a:xfrm>
+          <a:prstGeom prst="rect">
+            <a:avLst/>
+          </a:prstGeom>
+          <a:solidFill>
+            <a:schemeClr val="accent1">
+              <a:lumMod val="75000"/>
+            </a:schemeClr>
+          </a:solidFill>
+          <a:ln>
+            <a:noFill/>
+          </a:ln>
+        </p:spPr>
+        <p:style>
+          <a:lnRef idx="2">
+            <a:schemeClr val="accent1">
+              <a:shade val="50000"/>
+            </a:schemeClr>
+          </a:lnRef>
+          <a:fillRef idx="1">
+            <a:schemeClr val="accent1"/>
+          </a:fillRef>
+          <a:effectRef idx="0">
+            <a:schemeClr val="accent1"/>
+          </a:effectRef>
+          <a:fontRef idx="minor">
+            <a:schemeClr val="lt1"/>
+          </a:fontRef>
+        </p:style>
+        <p:txBody>
+          <a:bodyPr rtlCol="0" anchor="ctr"/>
+          <a:lstStyle/>
+          <a:p>
+            <a:pPr algn="ctr"/>
+            <a:r>
+              <a:rPr lang="en-US" dirty="0" smtClean="0">
+                <a:solidFill>
+                  <a:schemeClr val="bg1"/>
+                </a:solidFill>
+              </a:rPr>
+              <a:t>Host Operating System</a:t>
+            </a:r>
+          </a:p>
+        </p:txBody>
+      </p:sp>
+      <p:sp>
+        <p:nvSpPr>
+          <p:cNvPr id="6" name="Rectangle 5"/>
+          <p:cNvSpPr/>
+          <p:nvPr/>
+        </p:nvSpPr>
+        <p:spPr>
+          <a:xfrm>
+            <a:off x="1304693" y="5453832"/>
+            <a:ext cx="4415882" cy="422478"/>
+          </a:xfrm>
+          <a:prstGeom prst="rect">
+            <a:avLst/>
+          </a:prstGeom>
+          <a:solidFill>
+            <a:srgbClr val="A6A6A6"/>
+          </a:solidFill>
+          <a:ln>
+            <a:noFill/>
+          </a:ln>
+        </p:spPr>
+        <p:style>
+          <a:lnRef idx="2">
+            <a:schemeClr val="accent1">
+              <a:shade val="50000"/>
+            </a:schemeClr>
+          </a:lnRef>
+          <a:fillRef idx="1">
+            <a:schemeClr val="accent1"/>
+          </a:fillRef>
+          <a:effectRef idx="0">
+            <a:schemeClr val="accent1"/>
+          </a:effectRef>
+          <a:fontRef idx="minor">
+            <a:schemeClr val="lt1"/>
+          </a:fontRef>
+        </p:style>
+        <p:txBody>
+          <a:bodyPr rtlCol="0" anchor="ctr"/>
+          <a:lstStyle/>
+          <a:p>
+            <a:pPr algn="ctr"/>
+            <a:r>
+              <a:rPr lang="en-US" dirty="0" smtClean="0">
+                <a:solidFill>
+                  <a:schemeClr val="bg1"/>
+                </a:solidFill>
+              </a:rPr>
+              <a:t>Hypervisor</a:t>
+            </a:r>
+          </a:p>
+        </p:txBody>
+      </p:sp>
+      <p:sp>
+        <p:nvSpPr>
+          <p:cNvPr id="8" name="Rectangle 7"/>
+          <p:cNvSpPr/>
+          <p:nvPr/>
+        </p:nvSpPr>
+        <p:spPr>
+          <a:xfrm>
+            <a:off x="1304693" y="4496346"/>
+            <a:ext cx="1405054" cy="868072"/>
+          </a:xfrm>
+          <a:prstGeom prst="rect">
+            <a:avLst/>
+          </a:prstGeom>
+          <a:solidFill>
+            <a:srgbClr val="A6A6A6"/>
+          </a:solidFill>
+          <a:ln>
+            <a:noFill/>
+          </a:ln>
+        </p:spPr>
+        <p:style>
+          <a:lnRef idx="2">
+            <a:schemeClr val="accent1">
+              <a:shade val="50000"/>
+            </a:schemeClr>
+          </a:lnRef>
+          <a:fillRef idx="1">
+            <a:schemeClr val="accent1"/>
+          </a:fillRef>
+          <a:effectRef idx="0">
+            <a:schemeClr val="accent1"/>
+          </a:effectRef>
+          <a:fontRef idx="minor">
+            <a:schemeClr val="lt1"/>
+          </a:fontRef>
+        </p:style>
+        <p:txBody>
+          <a:bodyPr rtlCol="0" anchor="ctr"/>
+          <a:lstStyle/>
+          <a:p>
+            <a:pPr algn="ctr"/>
+            <a:r>
+              <a:rPr lang="en-US" dirty="0" smtClean="0">
+                <a:solidFill>
+                  <a:schemeClr val="bg1"/>
+                </a:solidFill>
+              </a:rPr>
+              <a:t>Guest OS</a:t>
+            </a:r>
+          </a:p>
+        </p:txBody>
+      </p:sp>
+      <p:sp>
+        <p:nvSpPr>
+          <p:cNvPr id="11" name="Rectangle 10"/>
+          <p:cNvSpPr/>
+          <p:nvPr/>
+        </p:nvSpPr>
+        <p:spPr>
+          <a:xfrm>
+            <a:off x="1304693" y="3984454"/>
+            <a:ext cx="1405054" cy="422478"/>
+          </a:xfrm>
+          <a:prstGeom prst="rect">
+            <a:avLst/>
+          </a:prstGeom>
+          <a:solidFill>
+            <a:schemeClr val="accent1">
+              <a:lumMod val="75000"/>
+            </a:schemeClr>
+          </a:solidFill>
+          <a:ln>
+            <a:noFill/>
+          </a:ln>
+        </p:spPr>
+        <p:style>
+          <a:lnRef idx="2">
+            <a:schemeClr val="accent1">
+              <a:shade val="50000"/>
+            </a:schemeClr>
+          </a:lnRef>
+          <a:fillRef idx="1">
+            <a:schemeClr val="accent1"/>
+          </a:fillRef>
+          <a:effectRef idx="0">
+            <a:schemeClr val="accent1"/>
+          </a:effectRef>
+          <a:fontRef idx="minor">
+            <a:schemeClr val="lt1"/>
+          </a:fontRef>
+        </p:style>
+        <p:txBody>
+          <a:bodyPr rtlCol="0" anchor="ctr"/>
+          <a:lstStyle/>
+          <a:p>
+            <a:pPr algn="ctr"/>
+            <a:r>
+              <a:rPr lang="en-US" dirty="0">
+                <a:solidFill>
+                  <a:schemeClr val="bg1"/>
+                </a:solidFill>
+              </a:rPr>
+              <a:t>Libraries</a:t>
+            </a:r>
+          </a:p>
+        </p:txBody>
+      </p:sp>
+      <p:sp>
+        <p:nvSpPr>
+          <p:cNvPr id="14" name="Rectangle 13"/>
+          <p:cNvSpPr/>
+          <p:nvPr/>
+        </p:nvSpPr>
+        <p:spPr>
+          <a:xfrm>
+            <a:off x="1304693" y="3472562"/>
+            <a:ext cx="1405054" cy="422478"/>
+          </a:xfrm>
+          <a:prstGeom prst="rect">
+            <a:avLst/>
+          </a:prstGeom>
+          <a:solidFill>
+            <a:schemeClr val="accent1">
+              <a:lumMod val="75000"/>
+            </a:schemeClr>
+          </a:solidFill>
+          <a:ln>
+            <a:noFill/>
+          </a:ln>
+        </p:spPr>
+        <p:style>
+          <a:lnRef idx="2">
+            <a:schemeClr val="accent1">
+              <a:shade val="50000"/>
+            </a:schemeClr>
+          </a:lnRef>
+          <a:fillRef idx="1">
+            <a:schemeClr val="accent1"/>
+          </a:fillRef>
+          <a:effectRef idx="0">
+            <a:schemeClr val="accent1"/>
+          </a:effectRef>
+          <a:fontRef idx="minor">
+            <a:schemeClr val="lt1"/>
+          </a:fontRef>
+        </p:style>
+        <p:txBody>
+          <a:bodyPr rtlCol="0" anchor="ctr"/>
+          <a:lstStyle/>
+          <a:p>
+            <a:pPr algn="ctr"/>
+            <a:r>
+              <a:rPr lang="en-US" dirty="0">
+                <a:solidFill>
+                  <a:schemeClr val="bg1"/>
+                </a:solidFill>
+              </a:rPr>
+              <a:t>App</a:t>
+            </a:r>
+          </a:p>
+        </p:txBody>
+      </p:sp>
+      <p:sp>
+        <p:nvSpPr>
+          <p:cNvPr id="23" name="Rectangle 22"/>
+          <p:cNvSpPr/>
+          <p:nvPr/>
+        </p:nvSpPr>
+        <p:spPr>
+          <a:xfrm>
+            <a:off x="2810107" y="4496346"/>
+            <a:ext cx="1405054" cy="868072"/>
+          </a:xfrm>
+          <a:prstGeom prst="rect">
+            <a:avLst/>
+          </a:prstGeom>
+          <a:solidFill>
+            <a:srgbClr val="A6A6A6"/>
+          </a:solidFill>
+          <a:ln>
+            <a:noFill/>
+          </a:ln>
+        </p:spPr>
+        <p:style>
+          <a:lnRef idx="2">
+            <a:schemeClr val="accent1">
+              <a:shade val="50000"/>
+            </a:schemeClr>
+          </a:lnRef>
+          <a:fillRef idx="1">
+            <a:schemeClr val="accent1"/>
+          </a:fillRef>
+          <a:effectRef idx="0">
+            <a:schemeClr val="accent1"/>
+          </a:effectRef>
+          <a:fontRef idx="minor">
+            <a:schemeClr val="lt1"/>
+          </a:fontRef>
+        </p:style>
+        <p:txBody>
+          <a:bodyPr rtlCol="0" anchor="ctr"/>
+          <a:lstStyle/>
+          <a:p>
+            <a:pPr algn="ctr"/>
+            <a:r>
+              <a:rPr lang="en-US" dirty="0" smtClean="0">
+                <a:solidFill>
+                  <a:schemeClr val="bg1"/>
+                </a:solidFill>
+              </a:rPr>
+              <a:t>Guest OS</a:t>
+            </a:r>
+          </a:p>
+        </p:txBody>
+      </p:sp>
+      <p:sp>
+        <p:nvSpPr>
+          <p:cNvPr id="24" name="Rectangle 23"/>
+          <p:cNvSpPr/>
+          <p:nvPr/>
+        </p:nvSpPr>
+        <p:spPr>
+          <a:xfrm>
+            <a:off x="2810107" y="3984454"/>
+            <a:ext cx="1405054" cy="422478"/>
+          </a:xfrm>
+          <a:prstGeom prst="rect">
+            <a:avLst/>
+          </a:prstGeom>
+          <a:solidFill>
+            <a:schemeClr val="accent1">
+              <a:lumMod val="75000"/>
+            </a:schemeClr>
+          </a:solidFill>
+          <a:ln>
+            <a:noFill/>
+          </a:ln>
+        </p:spPr>
+        <p:style>
+          <a:lnRef idx="2">
+            <a:schemeClr val="accent1">
+              <a:shade val="50000"/>
+            </a:schemeClr>
+          </a:lnRef>
+          <a:fillRef idx="1">
+            <a:schemeClr val="accent1"/>
+          </a:fillRef>
+          <a:effectRef idx="0">
+            <a:schemeClr val="accent1"/>
+          </a:effectRef>
+          <a:fontRef idx="minor">
+            <a:schemeClr val="lt1"/>
+          </a:fontRef>
+        </p:style>
+        <p:txBody>
+          <a:bodyPr rtlCol="0" anchor="ctr"/>
+          <a:lstStyle/>
+          <a:p>
+            <a:pPr algn="ctr"/>
+            <a:r>
+              <a:rPr lang="en-US" dirty="0">
+                <a:solidFill>
+                  <a:schemeClr val="bg1"/>
+                </a:solidFill>
+              </a:rPr>
+              <a:t>Libraries</a:t>
+            </a:r>
+          </a:p>
+        </p:txBody>
+      </p:sp>
+      <p:sp>
+        <p:nvSpPr>
+          <p:cNvPr id="25" name="Rectangle 24"/>
+          <p:cNvSpPr/>
+          <p:nvPr/>
+        </p:nvSpPr>
+        <p:spPr>
+          <a:xfrm>
+            <a:off x="2810107" y="3472562"/>
+            <a:ext cx="1405054" cy="422478"/>
+          </a:xfrm>
+          <a:prstGeom prst="rect">
+            <a:avLst/>
+          </a:prstGeom>
+          <a:solidFill>
+            <a:schemeClr val="accent1">
+              <a:lumMod val="75000"/>
+            </a:schemeClr>
+          </a:solidFill>
+          <a:ln>
+            <a:noFill/>
+          </a:ln>
+        </p:spPr>
+        <p:style>
+          <a:lnRef idx="2">
+            <a:schemeClr val="accent1">
+              <a:shade val="50000"/>
+            </a:schemeClr>
+          </a:lnRef>
+          <a:fillRef idx="1">
+            <a:schemeClr val="accent1"/>
+          </a:fillRef>
+          <a:effectRef idx="0">
+            <a:schemeClr val="accent1"/>
+          </a:effectRef>
+          <a:fontRef idx="minor">
+            <a:schemeClr val="lt1"/>
+          </a:fontRef>
+        </p:style>
+        <p:txBody>
+          <a:bodyPr rtlCol="0" anchor="ctr"/>
+          <a:lstStyle/>
+          <a:p>
+            <a:pPr algn="ctr"/>
+            <a:r>
+              <a:rPr lang="en-US" dirty="0">
+                <a:solidFill>
+                  <a:schemeClr val="bg1"/>
+                </a:solidFill>
+              </a:rPr>
+              <a:t>App</a:t>
+            </a:r>
+          </a:p>
+        </p:txBody>
+      </p:sp>
+      <p:sp>
+        <p:nvSpPr>
+          <p:cNvPr id="26" name="Rectangle 25"/>
+          <p:cNvSpPr/>
+          <p:nvPr/>
+        </p:nvSpPr>
+        <p:spPr>
+          <a:xfrm>
+            <a:off x="4315521" y="4496346"/>
+            <a:ext cx="1405054" cy="868072"/>
+          </a:xfrm>
+          <a:prstGeom prst="rect">
+            <a:avLst/>
+          </a:prstGeom>
+          <a:solidFill>
+            <a:srgbClr val="A6A6A6"/>
+          </a:solidFill>
+          <a:ln>
+            <a:noFill/>
+          </a:ln>
+        </p:spPr>
+        <p:style>
+          <a:lnRef idx="2">
+            <a:schemeClr val="accent1">
+              <a:shade val="50000"/>
+            </a:schemeClr>
+          </a:lnRef>
+          <a:fillRef idx="1">
+            <a:schemeClr val="accent1"/>
+          </a:fillRef>
+          <a:effectRef idx="0">
+            <a:schemeClr val="accent1"/>
+          </a:effectRef>
+          <a:fontRef idx="minor">
+            <a:schemeClr val="lt1"/>
+          </a:fontRef>
+        </p:style>
+        <p:txBody>
+          <a:bodyPr rtlCol="0" anchor="ctr"/>
+          <a:lstStyle/>
+          <a:p>
+            <a:pPr algn="ctr"/>
+            <a:r>
+              <a:rPr lang="en-US" dirty="0" smtClean="0">
+                <a:solidFill>
+                  <a:schemeClr val="bg1"/>
+                </a:solidFill>
+              </a:rPr>
+              <a:t>Guest OS</a:t>
+            </a:r>
+          </a:p>
+        </p:txBody>
+      </p:sp>
+      <p:sp>
+        <p:nvSpPr>
+          <p:cNvPr id="27" name="Rectangle 26"/>
+          <p:cNvSpPr/>
+          <p:nvPr/>
+        </p:nvSpPr>
+        <p:spPr>
+          <a:xfrm>
+            <a:off x="4315521" y="3984454"/>
+            <a:ext cx="1405054" cy="422478"/>
+          </a:xfrm>
+          <a:prstGeom prst="rect">
+            <a:avLst/>
+          </a:prstGeom>
+          <a:solidFill>
+            <a:schemeClr val="accent1">
+              <a:lumMod val="75000"/>
+            </a:schemeClr>
+          </a:solidFill>
+          <a:ln>
+            <a:noFill/>
+          </a:ln>
+        </p:spPr>
+        <p:style>
+          <a:lnRef idx="2">
+            <a:schemeClr val="accent1">
+              <a:shade val="50000"/>
+            </a:schemeClr>
+          </a:lnRef>
+          <a:fillRef idx="1">
+            <a:schemeClr val="accent1"/>
+          </a:fillRef>
+          <a:effectRef idx="0">
+            <a:schemeClr val="accent1"/>
+          </a:effectRef>
+          <a:fontRef idx="minor">
+            <a:schemeClr val="lt1"/>
+          </a:fontRef>
+        </p:style>
+        <p:txBody>
+          <a:bodyPr rtlCol="0" anchor="ctr"/>
+          <a:lstStyle/>
+          <a:p>
+            <a:pPr algn="ctr"/>
+            <a:r>
+              <a:rPr lang="en-US" dirty="0">
+                <a:solidFill>
+                  <a:schemeClr val="bg1"/>
+                </a:solidFill>
+              </a:rPr>
+              <a:t>Libraries</a:t>
+            </a:r>
+          </a:p>
+        </p:txBody>
+      </p:sp>
+      <p:sp>
+        <p:nvSpPr>
+          <p:cNvPr id="28" name="Rectangle 27"/>
+          <p:cNvSpPr/>
+          <p:nvPr/>
+        </p:nvSpPr>
+        <p:spPr>
+          <a:xfrm>
+            <a:off x="4315521" y="3472562"/>
+            <a:ext cx="1405054" cy="422478"/>
+          </a:xfrm>
+          <a:prstGeom prst="rect">
+            <a:avLst/>
+          </a:prstGeom>
+          <a:solidFill>
+            <a:schemeClr val="accent1">
+              <a:lumMod val="75000"/>
+            </a:schemeClr>
+          </a:solidFill>
+          <a:ln>
+            <a:noFill/>
+          </a:ln>
+        </p:spPr>
+        <p:style>
+          <a:lnRef idx="2">
+            <a:schemeClr val="accent1">
+              <a:shade val="50000"/>
+            </a:schemeClr>
+          </a:lnRef>
+          <a:fillRef idx="1">
+            <a:schemeClr val="accent1"/>
+          </a:fillRef>
+          <a:effectRef idx="0">
+            <a:schemeClr val="accent1"/>
+          </a:effectRef>
+          <a:fontRef idx="minor">
+            <a:schemeClr val="lt1"/>
+          </a:fontRef>
+        </p:style>
+        <p:txBody>
+          <a:bodyPr rtlCol="0" anchor="ctr"/>
+          <a:lstStyle/>
+          <a:p>
+            <a:pPr algn="ctr"/>
+            <a:r>
+              <a:rPr lang="en-US" dirty="0">
+                <a:solidFill>
+                  <a:schemeClr val="bg1"/>
+                </a:solidFill>
+              </a:rPr>
+              <a:t>App</a:t>
+            </a:r>
+          </a:p>
+        </p:txBody>
+      </p:sp>
+      <p:sp>
+        <p:nvSpPr>
+          <p:cNvPr id="29" name="Rectangle 28"/>
+          <p:cNvSpPr/>
+          <p:nvPr/>
+        </p:nvSpPr>
+        <p:spPr>
+          <a:xfrm>
+            <a:off x="6501162" y="5965724"/>
+            <a:ext cx="4415882" cy="422478"/>
+          </a:xfrm>
+          <a:prstGeom prst="rect">
+            <a:avLst/>
+          </a:prstGeom>
+          <a:solidFill>
+            <a:schemeClr val="accent1">
+              <a:lumMod val="75000"/>
+            </a:schemeClr>
+          </a:solidFill>
+          <a:ln>
+            <a:noFill/>
+          </a:ln>
+        </p:spPr>
+        <p:style>
+          <a:lnRef idx="2">
+            <a:schemeClr val="accent1">
+              <a:shade val="50000"/>
+            </a:schemeClr>
+          </a:lnRef>
+          <a:fillRef idx="1">
+            <a:schemeClr val="accent1"/>
+          </a:fillRef>
+          <a:effectRef idx="0">
+            <a:schemeClr val="accent1"/>
+          </a:effectRef>
+          <a:fontRef idx="minor">
+            <a:schemeClr val="lt1"/>
+          </a:fontRef>
+        </p:style>
+        <p:txBody>
+          <a:bodyPr rtlCol="0" anchor="ctr"/>
+          <a:lstStyle/>
+          <a:p>
+            <a:pPr algn="ctr"/>
+            <a:r>
+              <a:rPr lang="en-US" dirty="0" smtClean="0">
+                <a:solidFill>
+                  <a:schemeClr val="bg1"/>
+                </a:solidFill>
+              </a:rPr>
+              <a:t>Operating System</a:t>
+            </a:r>
+          </a:p>
+        </p:txBody>
+      </p:sp>
+      <p:sp>
+        <p:nvSpPr>
+          <p:cNvPr id="30" name="Rectangle 29"/>
+          <p:cNvSpPr/>
+          <p:nvPr/>
+        </p:nvSpPr>
+        <p:spPr>
+          <a:xfrm>
+            <a:off x="6501162" y="5453832"/>
+            <a:ext cx="4415882" cy="422478"/>
+          </a:xfrm>
+          <a:prstGeom prst="rect">
+            <a:avLst/>
+          </a:prstGeom>
+          <a:solidFill>
+            <a:srgbClr val="A6A6A6"/>
+          </a:solidFill>
+          <a:ln>
+            <a:noFill/>
+          </a:ln>
+        </p:spPr>
+        <p:style>
+          <a:lnRef idx="2">
+            <a:schemeClr val="accent1">
+              <a:shade val="50000"/>
+            </a:schemeClr>
+          </a:lnRef>
+          <a:fillRef idx="1">
+            <a:schemeClr val="accent1"/>
+          </a:fillRef>
+          <a:effectRef idx="0">
+            <a:schemeClr val="accent1"/>
+          </a:effectRef>
+          <a:fontRef idx="minor">
+            <a:schemeClr val="lt1"/>
+          </a:fontRef>
+        </p:style>
+        <p:txBody>
+          <a:bodyPr rtlCol="0" anchor="ctr"/>
+          <a:lstStyle/>
+          <a:p>
+            <a:pPr algn="ctr"/>
+            <a:r>
+              <a:rPr lang="en-US" dirty="0" smtClean="0">
+                <a:solidFill>
+                  <a:schemeClr val="bg1"/>
+                </a:solidFill>
+              </a:rPr>
+              <a:t>Container Engine</a:t>
+            </a:r>
+          </a:p>
+        </p:txBody>
+      </p:sp>
+      <p:sp>
+        <p:nvSpPr>
+          <p:cNvPr id="32" name="Rectangle 31"/>
+          <p:cNvSpPr/>
+          <p:nvPr/>
+        </p:nvSpPr>
+        <p:spPr>
+          <a:xfrm>
+            <a:off x="6501162" y="4941940"/>
+            <a:ext cx="1405054" cy="422478"/>
+          </a:xfrm>
+          <a:prstGeom prst="rect">
+            <a:avLst/>
+          </a:prstGeom>
+          <a:solidFill>
+            <a:schemeClr val="accent1">
+              <a:lumMod val="75000"/>
+            </a:schemeClr>
+          </a:solidFill>
+          <a:ln>
+            <a:noFill/>
+          </a:ln>
+        </p:spPr>
+        <p:style>
+          <a:lnRef idx="2">
+            <a:schemeClr val="accent1">
+              <a:shade val="50000"/>
+            </a:schemeClr>
+          </a:lnRef>
+          <a:fillRef idx="1">
+            <a:schemeClr val="accent1"/>
+          </a:fillRef>
+          <a:effectRef idx="0">
+            <a:schemeClr val="accent1"/>
+          </a:effectRef>
+          <a:fontRef idx="minor">
+            <a:schemeClr val="lt1"/>
+          </a:fontRef>
+        </p:style>
+        <p:txBody>
+          <a:bodyPr rtlCol="0" anchor="ctr"/>
+          <a:lstStyle/>
+          <a:p>
+            <a:pPr algn="ctr"/>
+            <a:r>
+              <a:rPr lang="en-US" dirty="0">
+                <a:solidFill>
+                  <a:schemeClr val="bg1"/>
+                </a:solidFill>
+              </a:rPr>
+              <a:t>Libraries</a:t>
+            </a:r>
+          </a:p>
+        </p:txBody>
+      </p:sp>
+      <p:sp>
+        <p:nvSpPr>
+          <p:cNvPr id="33" name="Rectangle 32"/>
+          <p:cNvSpPr/>
+          <p:nvPr/>
+        </p:nvSpPr>
+        <p:spPr>
+          <a:xfrm>
+            <a:off x="6501162" y="4430048"/>
+            <a:ext cx="1405054" cy="422478"/>
+          </a:xfrm>
+          <a:prstGeom prst="rect">
+            <a:avLst/>
+          </a:prstGeom>
+          <a:solidFill>
+            <a:schemeClr val="accent1">
+              <a:lumMod val="75000"/>
+            </a:schemeClr>
+          </a:solidFill>
+          <a:ln>
+            <a:noFill/>
+          </a:ln>
+        </p:spPr>
+        <p:style>
+          <a:lnRef idx="2">
+            <a:schemeClr val="accent1">
+              <a:shade val="50000"/>
+            </a:schemeClr>
+          </a:lnRef>
+          <a:fillRef idx="1">
+            <a:schemeClr val="accent1"/>
+          </a:fillRef>
+          <a:effectRef idx="0">
+            <a:schemeClr val="accent1"/>
+          </a:effectRef>
+          <a:fontRef idx="minor">
+            <a:schemeClr val="lt1"/>
+          </a:fontRef>
+        </p:style>
+        <p:txBody>
+          <a:bodyPr rtlCol="0" anchor="ctr"/>
+          <a:lstStyle/>
+          <a:p>
+            <a:pPr algn="ctr"/>
+            <a:r>
+              <a:rPr lang="en-US" dirty="0">
+                <a:solidFill>
+                  <a:schemeClr val="bg1"/>
+                </a:solidFill>
+              </a:rPr>
+              <a:t>App</a:t>
+            </a:r>
+          </a:p>
+        </p:txBody>
+      </p:sp>
+      <p:sp>
+        <p:nvSpPr>
+          <p:cNvPr id="35" name="Rectangle 34"/>
+          <p:cNvSpPr/>
+          <p:nvPr/>
+        </p:nvSpPr>
+        <p:spPr>
+          <a:xfrm>
+            <a:off x="8006576" y="4941940"/>
+            <a:ext cx="1405054" cy="422478"/>
+          </a:xfrm>
+          <a:prstGeom prst="rect">
+            <a:avLst/>
+          </a:prstGeom>
+          <a:solidFill>
+            <a:schemeClr val="accent1">
+              <a:lumMod val="75000"/>
+            </a:schemeClr>
+          </a:solidFill>
+          <a:ln>
+            <a:noFill/>
+          </a:ln>
+        </p:spPr>
+        <p:style>
+          <a:lnRef idx="2">
+            <a:schemeClr val="accent1">
+              <a:shade val="50000"/>
+            </a:schemeClr>
+          </a:lnRef>
+          <a:fillRef idx="1">
+            <a:schemeClr val="accent1"/>
+          </a:fillRef>
+          <a:effectRef idx="0">
+            <a:schemeClr val="accent1"/>
+          </a:effectRef>
+          <a:fontRef idx="minor">
+            <a:schemeClr val="lt1"/>
+          </a:fontRef>
+        </p:style>
+        <p:txBody>
+          <a:bodyPr rtlCol="0" anchor="ctr"/>
+          <a:lstStyle/>
+          <a:p>
+            <a:pPr algn="ctr"/>
+            <a:r>
+              <a:rPr lang="en-US" dirty="0">
+                <a:solidFill>
+                  <a:schemeClr val="bg1"/>
+                </a:solidFill>
+              </a:rPr>
+              <a:t>Libraries</a:t>
+            </a:r>
+          </a:p>
+        </p:txBody>
+      </p:sp>
+      <p:sp>
+        <p:nvSpPr>
+          <p:cNvPr id="36" name="Rectangle 35"/>
+          <p:cNvSpPr/>
+          <p:nvPr/>
+        </p:nvSpPr>
+        <p:spPr>
+          <a:xfrm>
+            <a:off x="8006576" y="4430048"/>
+            <a:ext cx="1405054" cy="422478"/>
+          </a:xfrm>
+          <a:prstGeom prst="rect">
+            <a:avLst/>
+          </a:prstGeom>
+          <a:solidFill>
+            <a:schemeClr val="accent1">
+              <a:lumMod val="75000"/>
+            </a:schemeClr>
+          </a:solidFill>
+          <a:ln>
+            <a:noFill/>
+          </a:ln>
+        </p:spPr>
+        <p:style>
+          <a:lnRef idx="2">
+            <a:schemeClr val="accent1">
+              <a:shade val="50000"/>
+            </a:schemeClr>
+          </a:lnRef>
+          <a:fillRef idx="1">
+            <a:schemeClr val="accent1"/>
+          </a:fillRef>
+          <a:effectRef idx="0">
+            <a:schemeClr val="accent1"/>
+          </a:effectRef>
+          <a:fontRef idx="minor">
+            <a:schemeClr val="lt1"/>
+          </a:fontRef>
+        </p:style>
+        <p:txBody>
+          <a:bodyPr rtlCol="0" anchor="ctr"/>
+          <a:lstStyle/>
+          <a:p>
+            <a:pPr algn="ctr"/>
+            <a:r>
+              <a:rPr lang="en-US" dirty="0">
+                <a:solidFill>
+                  <a:schemeClr val="bg1"/>
+                </a:solidFill>
+              </a:rPr>
+              <a:t>App</a:t>
+            </a:r>
+          </a:p>
+        </p:txBody>
+      </p:sp>
+      <p:sp>
+        <p:nvSpPr>
+          <p:cNvPr id="38" name="Rectangle 37"/>
+          <p:cNvSpPr/>
+          <p:nvPr/>
+        </p:nvSpPr>
+        <p:spPr>
+          <a:xfrm>
+            <a:off x="9511990" y="4941940"/>
+            <a:ext cx="1405054" cy="422478"/>
+          </a:xfrm>
+          <a:prstGeom prst="rect">
+            <a:avLst/>
+          </a:prstGeom>
+          <a:solidFill>
+            <a:schemeClr val="accent1">
+              <a:lumMod val="75000"/>
+            </a:schemeClr>
+          </a:solidFill>
+          <a:ln>
+            <a:noFill/>
+          </a:ln>
+        </p:spPr>
+        <p:style>
+          <a:lnRef idx="2">
+            <a:schemeClr val="accent1">
+              <a:shade val="50000"/>
+            </a:schemeClr>
+          </a:lnRef>
+          <a:fillRef idx="1">
+            <a:schemeClr val="accent1"/>
+          </a:fillRef>
+          <a:effectRef idx="0">
+            <a:schemeClr val="accent1"/>
+          </a:effectRef>
+          <a:fontRef idx="minor">
+            <a:schemeClr val="lt1"/>
+          </a:fontRef>
+        </p:style>
+        <p:txBody>
+          <a:bodyPr rtlCol="0" anchor="ctr"/>
+          <a:lstStyle/>
+          <a:p>
+            <a:pPr algn="ctr"/>
+            <a:r>
+              <a:rPr lang="en-US" dirty="0">
+                <a:solidFill>
+                  <a:schemeClr val="bg1"/>
+                </a:solidFill>
+              </a:rPr>
+              <a:t>Libraries</a:t>
+            </a:r>
+          </a:p>
+        </p:txBody>
+      </p:sp>
+      <p:sp>
+        <p:nvSpPr>
+          <p:cNvPr id="39" name="Rectangle 38"/>
+          <p:cNvSpPr/>
+          <p:nvPr/>
+        </p:nvSpPr>
+        <p:spPr>
+          <a:xfrm>
+            <a:off x="9511990" y="4430048"/>
+            <a:ext cx="1405054" cy="422478"/>
+          </a:xfrm>
+          <a:prstGeom prst="rect">
+            <a:avLst/>
+          </a:prstGeom>
+          <a:solidFill>
+            <a:schemeClr val="accent1">
+              <a:lumMod val="75000"/>
+            </a:schemeClr>
+          </a:solidFill>
+          <a:ln>
+            <a:noFill/>
+          </a:ln>
+        </p:spPr>
+        <p:style>
+          <a:lnRef idx="2">
+            <a:schemeClr val="accent1">
+              <a:shade val="50000"/>
+            </a:schemeClr>
+          </a:lnRef>
+          <a:fillRef idx="1">
+            <a:schemeClr val="accent1"/>
+          </a:fillRef>
+          <a:effectRef idx="0">
+            <a:schemeClr val="accent1"/>
+          </a:effectRef>
+          <a:fontRef idx="minor">
+            <a:schemeClr val="lt1"/>
+          </a:fontRef>
+        </p:style>
+        <p:txBody>
+          <a:bodyPr rtlCol="0" anchor="ctr"/>
+          <a:lstStyle/>
+          <a:p>
+            <a:pPr algn="ctr"/>
+            <a:r>
+              <a:rPr lang="en-US" dirty="0">
+                <a:solidFill>
+                  <a:schemeClr val="bg1"/>
+                </a:solidFill>
+              </a:rPr>
+              <a:t>App</a:t>
+            </a:r>
+          </a:p>
+        </p:txBody>
+      </p:sp>
+      <p:sp>
+        <p:nvSpPr>
+          <p:cNvPr id="40" name="TextBox 39"/>
+          <p:cNvSpPr txBox="1"/>
+          <p:nvPr/>
+        </p:nvSpPr>
+        <p:spPr>
+          <a:xfrm>
+            <a:off x="1215483" y="3010897"/>
+            <a:ext cx="4505092" cy="461665"/>
+          </a:xfrm>
+          <a:prstGeom prst="rect">
+            <a:avLst/>
+          </a:prstGeom>
+          <a:noFill/>
+        </p:spPr>
+        <p:txBody>
+          <a:bodyPr wrap="square" rtlCol="0">
+            <a:spAutoFit/>
+          </a:bodyPr>
+          <a:lstStyle/>
+          <a:p>
+            <a:pPr algn="ctr"/>
+            <a:r>
+              <a:rPr lang="en-US" sz="2400" dirty="0" smtClean="0">
+                <a:solidFill>
+                  <a:srgbClr val="235888"/>
+                </a:solidFill>
+              </a:rPr>
+              <a:t>Virtual Machines</a:t>
+            </a:r>
+            <a:endParaRPr lang="en-US" sz="2400" dirty="0">
+              <a:solidFill>
+                <a:srgbClr val="235888"/>
+              </a:solidFill>
+            </a:endParaRPr>
+          </a:p>
+        </p:txBody>
+      </p:sp>
+      <p:sp>
+        <p:nvSpPr>
+          <p:cNvPr id="41" name="TextBox 40"/>
+          <p:cNvSpPr txBox="1"/>
+          <p:nvPr/>
+        </p:nvSpPr>
+        <p:spPr>
+          <a:xfrm>
+            <a:off x="6456557" y="3964860"/>
+            <a:ext cx="4505092" cy="461665"/>
+          </a:xfrm>
+          <a:prstGeom prst="rect">
+            <a:avLst/>
+          </a:prstGeom>
+          <a:noFill/>
+        </p:spPr>
+        <p:txBody>
+          <a:bodyPr wrap="square" rtlCol="0">
+            <a:spAutoFit/>
+          </a:bodyPr>
+          <a:lstStyle/>
+          <a:p>
+            <a:pPr algn="ctr"/>
+            <a:r>
+              <a:rPr lang="en-US" sz="2400" dirty="0" smtClean="0">
+                <a:solidFill>
+                  <a:srgbClr val="235888"/>
+                </a:solidFill>
+              </a:rPr>
+              <a:t>Containers</a:t>
+            </a:r>
+            <a:endParaRPr lang="en-US" sz="2400" dirty="0">
+              <a:solidFill>
+                <a:srgbClr val="235888"/>
+              </a:solidFill>
+            </a:endParaRPr>
           </a:p>
         </p:txBody>
       </p:sp>
@@ -21284,12 +22831,107 @@
             <p:ph idx="1"/>
           </p:nvPr>
         </p:nvSpPr>
-        <p:spPr/>
-        <p:txBody>
-          <a:bodyPr/>
+        <p:spPr>
+          <a:xfrm>
+            <a:off x="838200" y="1825625"/>
+            <a:ext cx="5729868" cy="4351338"/>
+          </a:xfrm>
+        </p:spPr>
+        <p:txBody>
+          <a:bodyPr>
+            <a:normAutofit/>
+          </a:bodyPr>
           <a:lstStyle/>
           <a:p>
-            <a:endParaRPr lang="en-US"/>
+            <a:r>
+              <a:rPr lang="en-US" dirty="0" smtClean="0"/>
+              <a:t>Leading open-source containerization platform</a:t>
+            </a:r>
+          </a:p>
+          <a:p>
+            <a:endParaRPr lang="en-US" dirty="0"/>
+          </a:p>
+          <a:p>
+            <a:endParaRPr lang="en-US" dirty="0" smtClean="0"/>
+          </a:p>
+          <a:p>
+            <a:endParaRPr lang="en-US" dirty="0"/>
+          </a:p>
+          <a:p>
+            <a:endParaRPr lang="en-US" dirty="0" smtClean="0"/>
+          </a:p>
+          <a:p>
+            <a:endParaRPr lang="en-US" dirty="0"/>
+          </a:p>
+          <a:p>
+            <a:r>
+              <a:rPr lang="en-US" dirty="0" smtClean="0"/>
+              <a:t>Supported natively in Azure via Azure Container Service</a:t>
+            </a:r>
+            <a:endParaRPr lang="en-US" dirty="0"/>
+          </a:p>
+        </p:txBody>
+      </p:sp>
+      <p:pic>
+        <p:nvPicPr>
+          <p:cNvPr id="4" name="Picture 3"/>
+          <p:cNvPicPr>
+            <a:picLocks noChangeAspect="1"/>
+          </p:cNvPicPr>
+          <p:nvPr/>
+        </p:nvPicPr>
+        <p:blipFill>
+          <a:blip r:embed="rId3" cstate="print">
+            <a:extLst>
+              <a:ext uri="{28A0092B-C50C-407E-A947-70E740481C1C}">
+                <a14:useLocalDpi xmlns:a14="http://schemas.microsoft.com/office/drawing/2010/main" val="0"/>
+              </a:ext>
+            </a:extLst>
+          </a:blip>
+          <a:stretch>
+            <a:fillRect/>
+          </a:stretch>
+        </p:blipFill>
+        <p:spPr>
+          <a:xfrm>
+            <a:off x="5568568" y="1296374"/>
+            <a:ext cx="6497052" cy="5409839"/>
+          </a:xfrm>
+          <a:prstGeom prst="rect">
+            <a:avLst/>
+          </a:prstGeom>
+        </p:spPr>
+      </p:pic>
+      <p:sp>
+        <p:nvSpPr>
+          <p:cNvPr id="5" name="TextBox 4"/>
+          <p:cNvSpPr txBox="1"/>
+          <p:nvPr/>
+        </p:nvSpPr>
+        <p:spPr>
+          <a:xfrm>
+            <a:off x="1059365" y="2985630"/>
+            <a:ext cx="4650059" cy="2031325"/>
+          </a:xfrm>
+          <a:prstGeom prst="rect">
+            <a:avLst/>
+          </a:prstGeom>
+          <a:noFill/>
+        </p:spPr>
+        <p:txBody>
+          <a:bodyPr wrap="square" rtlCol="0">
+            <a:spAutoFit/>
+          </a:bodyPr>
+          <a:lstStyle/>
+          <a:p>
+            <a:r>
+              <a:rPr lang="en-US" i="1" dirty="0">
+                <a:solidFill>
+                  <a:srgbClr val="4D9CD7"/>
+                </a:solidFill>
+              </a:rPr>
+              <a:t>Docker containers wrap up a piece of software in a complete filesystem that contains everything it needs to run: code, runtime, system tools, system libraries – anything you can install on a server. This guarantees that it will always run the same, regardless of the environment it is running in</a:t>
+            </a:r>
           </a:p>
         </p:txBody>
       </p:sp>

</xml_diff>

<commit_message>
Corrected typo in ACS slide
</commit_message>
<xml_diff>
--- a/Workshop/6. HPC/HPC and Azure Container Service.pptx
+++ b/Workshop/6. HPC/HPC and Azure Container Service.pptx
@@ -17495,11 +17495,7 @@
           <a:p>
             <a:r>
               <a:rPr lang="en-US" dirty="0" smtClean="0"/>
-              <a:t>Docker </a:t>
-            </a:r>
-            <a:r>
-              <a:rPr lang="en-US" dirty="0" smtClean="0"/>
-              <a:t>CLI</a:t>
+              <a:t>Docker CLI</a:t>
             </a:r>
             <a:endParaRPr lang="en-US" dirty="0"/>
           </a:p>
@@ -19079,7 +19075,14 @@
                 <a:latin typeface="Courier New" panose="02070309020205020404" pitchFamily="49" charset="0"/>
                 <a:cs typeface="Courier New" panose="02070309020205020404" pitchFamily="49" charset="0"/>
               </a:rPr>
-              <a:t> -p 2200 -L 22375:127.0.0.1.2375</a:t>
+              <a:t> -p 2200 -L </a:t>
+            </a:r>
+            <a:r>
+              <a:rPr lang="de-DE" sz="2800" b="1" dirty="0" smtClean="0">
+                <a:latin typeface="Courier New" panose="02070309020205020404" pitchFamily="49" charset="0"/>
+                <a:cs typeface="Courier New" panose="02070309020205020404" pitchFamily="49" charset="0"/>
+              </a:rPr>
+              <a:t>22375:127.0.0.1:2375</a:t>
             </a:r>
             <a:endParaRPr lang="en-US" sz="2800" b="1" dirty="0">
               <a:gradFill>
@@ -25286,11 +25289,7 @@
           <a:p>
             <a:r>
               <a:rPr lang="en-US" dirty="0" smtClean="0"/>
-              <a:t>Supported natively in </a:t>
-            </a:r>
-            <a:r>
-              <a:rPr lang="en-US" dirty="0" smtClean="0"/>
-              <a:t>Azure</a:t>
+              <a:t>Supported natively in Azure</a:t>
             </a:r>
             <a:endParaRPr lang="en-US" dirty="0"/>
           </a:p>

</xml_diff>